<commit_message>
Updates for cycle 2
</commit_message>
<xml_diff>
--- a/Presentations_Main/03_JWST_Cycle2_Proposals.pptx
+++ b/Presentations_Main/03_JWST_Cycle2_Proposals.pptx
@@ -5,7 +5,7 @@
     <p:sldMasterId id="2147483652" r:id="rId1"/>
   </p:sldMasterIdLst>
   <p:notesMasterIdLst>
-    <p:notesMasterId r:id="rId27"/>
+    <p:notesMasterId r:id="rId28"/>
   </p:notesMasterIdLst>
   <p:sldIdLst>
     <p:sldId id="281" r:id="rId2"/>
@@ -31,8 +31,9 @@
     <p:sldId id="276" r:id="rId22"/>
     <p:sldId id="277" r:id="rId23"/>
     <p:sldId id="278" r:id="rId24"/>
-    <p:sldId id="279" r:id="rId25"/>
-    <p:sldId id="280" r:id="rId26"/>
+    <p:sldId id="282" r:id="rId25"/>
+    <p:sldId id="279" r:id="rId26"/>
+    <p:sldId id="280" r:id="rId27"/>
   </p:sldIdLst>
   <p:sldSz cx="24384000" cy="13716000"/>
   <p:notesSz cx="6858000" cy="9144000"/>
@@ -383,6 +384,7 @@
 <file path=ppt/revisionInfo.xml><?xml version="1.0" encoding="utf-8"?>
 <p1510:revInfo xmlns:a="http://schemas.openxmlformats.org/drawingml/2006/main" xmlns:r="http://schemas.openxmlformats.org/officeDocument/2006/relationships" xmlns:p1510="http://schemas.microsoft.com/office/powerpoint/2015/10/main">
   <p1510:revLst>
+    <p1510:client id="{AADD8645-BC02-318B-82DD-CC37894FE605}" v="95" dt="2022-11-29T04:00:32.168"/>
     <p1510:client id="{C1FE669F-5382-5711-E293-43B797C6BA48}" v="120" dt="2020-03-13T02:46:07.902"/>
   </p1510:revLst>
 </p1510:revInfo>
@@ -591,6 +593,250 @@
           <pc:docMk/>
           <pc:sldMk cId="0" sldId="279"/>
         </pc:sldMkLst>
+      </pc:sldChg>
+    </pc:docChg>
+  </pc:docChgLst>
+  <pc:docChgLst>
+    <pc:chgData name="Colin Jacobs" userId="S::colinjacobs@swin.edu.au::1ae92db4-13e0-4387-a410-e0d0397dbc42" providerId="AD" clId="Web-{AADD8645-BC02-318B-82DD-CC37894FE605}"/>
+    <pc:docChg chg="addSld modSld">
+      <pc:chgData name="Colin Jacobs" userId="S::colinjacobs@swin.edu.au::1ae92db4-13e0-4387-a410-e0d0397dbc42" providerId="AD" clId="Web-{AADD8645-BC02-318B-82DD-CC37894FE605}" dt="2022-11-29T04:00:32.168" v="81" actId="14100"/>
+      <pc:docMkLst>
+        <pc:docMk/>
+      </pc:docMkLst>
+      <pc:sldChg chg="modSp">
+        <pc:chgData name="Colin Jacobs" userId="S::colinjacobs@swin.edu.au::1ae92db4-13e0-4387-a410-e0d0397dbc42" providerId="AD" clId="Web-{AADD8645-BC02-318B-82DD-CC37894FE605}" dt="2022-11-29T03:38:07.387" v="11" actId="20577"/>
+        <pc:sldMkLst>
+          <pc:docMk/>
+          <pc:sldMk cId="0" sldId="259"/>
+        </pc:sldMkLst>
+        <pc:spChg chg="mod">
+          <ac:chgData name="Colin Jacobs" userId="S::colinjacobs@swin.edu.au::1ae92db4-13e0-4387-a410-e0d0397dbc42" providerId="AD" clId="Web-{AADD8645-BC02-318B-82DD-CC37894FE605}" dt="2022-11-29T03:38:07.387" v="11" actId="20577"/>
+          <ac:spMkLst>
+            <pc:docMk/>
+            <pc:sldMk cId="0" sldId="259"/>
+            <ac:spMk id="88" creationId="{00000000-0000-0000-0000-000000000000}"/>
+          </ac:spMkLst>
+        </pc:spChg>
+      </pc:sldChg>
+      <pc:sldChg chg="modSp">
+        <pc:chgData name="Colin Jacobs" userId="S::colinjacobs@swin.edu.au::1ae92db4-13e0-4387-a410-e0d0397dbc42" providerId="AD" clId="Web-{AADD8645-BC02-318B-82DD-CC37894FE605}" dt="2022-11-29T03:38:33.013" v="13" actId="20577"/>
+        <pc:sldMkLst>
+          <pc:docMk/>
+          <pc:sldMk cId="0" sldId="261"/>
+        </pc:sldMkLst>
+        <pc:spChg chg="mod">
+          <ac:chgData name="Colin Jacobs" userId="S::colinjacobs@swin.edu.au::1ae92db4-13e0-4387-a410-e0d0397dbc42" providerId="AD" clId="Web-{AADD8645-BC02-318B-82DD-CC37894FE605}" dt="2022-11-29T03:38:33.013" v="13" actId="20577"/>
+          <ac:spMkLst>
+            <pc:docMk/>
+            <pc:sldMk cId="0" sldId="261"/>
+            <ac:spMk id="95" creationId="{00000000-0000-0000-0000-000000000000}"/>
+          </ac:spMkLst>
+        </pc:spChg>
+      </pc:sldChg>
+      <pc:sldChg chg="modSp">
+        <pc:chgData name="Colin Jacobs" userId="S::colinjacobs@swin.edu.au::1ae92db4-13e0-4387-a410-e0d0397dbc42" providerId="AD" clId="Web-{AADD8645-BC02-318B-82DD-CC37894FE605}" dt="2022-11-29T03:39:19.561" v="15" actId="20577"/>
+        <pc:sldMkLst>
+          <pc:docMk/>
+          <pc:sldMk cId="0" sldId="262"/>
+        </pc:sldMkLst>
+        <pc:spChg chg="mod">
+          <ac:chgData name="Colin Jacobs" userId="S::colinjacobs@swin.edu.au::1ae92db4-13e0-4387-a410-e0d0397dbc42" providerId="AD" clId="Web-{AADD8645-BC02-318B-82DD-CC37894FE605}" dt="2022-11-29T03:39:19.561" v="15" actId="20577"/>
+          <ac:spMkLst>
+            <pc:docMk/>
+            <pc:sldMk cId="0" sldId="262"/>
+            <ac:spMk id="103" creationId="{00000000-0000-0000-0000-000000000000}"/>
+          </ac:spMkLst>
+        </pc:spChg>
+      </pc:sldChg>
+      <pc:sldChg chg="modSp">
+        <pc:chgData name="Colin Jacobs" userId="S::colinjacobs@swin.edu.au::1ae92db4-13e0-4387-a410-e0d0397dbc42" providerId="AD" clId="Web-{AADD8645-BC02-318B-82DD-CC37894FE605}" dt="2022-11-29T03:39:37.108" v="18" actId="20577"/>
+        <pc:sldMkLst>
+          <pc:docMk/>
+          <pc:sldMk cId="0" sldId="263"/>
+        </pc:sldMkLst>
+        <pc:spChg chg="mod">
+          <ac:chgData name="Colin Jacobs" userId="S::colinjacobs@swin.edu.au::1ae92db4-13e0-4387-a410-e0d0397dbc42" providerId="AD" clId="Web-{AADD8645-BC02-318B-82DD-CC37894FE605}" dt="2022-11-29T03:39:37.108" v="18" actId="20577"/>
+          <ac:spMkLst>
+            <pc:docMk/>
+            <pc:sldMk cId="0" sldId="263"/>
+            <ac:spMk id="116" creationId="{00000000-0000-0000-0000-000000000000}"/>
+          </ac:spMkLst>
+        </pc:spChg>
+      </pc:sldChg>
+      <pc:sldChg chg="modSp">
+        <pc:chgData name="Colin Jacobs" userId="S::colinjacobs@swin.edu.au::1ae92db4-13e0-4387-a410-e0d0397dbc42" providerId="AD" clId="Web-{AADD8645-BC02-318B-82DD-CC37894FE605}" dt="2022-11-29T03:42:21.018" v="39" actId="20577"/>
+        <pc:sldMkLst>
+          <pc:docMk/>
+          <pc:sldMk cId="0" sldId="264"/>
+        </pc:sldMkLst>
+        <pc:spChg chg="mod">
+          <ac:chgData name="Colin Jacobs" userId="S::colinjacobs@swin.edu.au::1ae92db4-13e0-4387-a410-e0d0397dbc42" providerId="AD" clId="Web-{AADD8645-BC02-318B-82DD-CC37894FE605}" dt="2022-11-29T03:42:21.018" v="39" actId="20577"/>
+          <ac:spMkLst>
+            <pc:docMk/>
+            <pc:sldMk cId="0" sldId="264"/>
+            <ac:spMk id="120" creationId="{00000000-0000-0000-0000-000000000000}"/>
+          </ac:spMkLst>
+        </pc:spChg>
+      </pc:sldChg>
+      <pc:sldChg chg="modSp">
+        <pc:chgData name="Colin Jacobs" userId="S::colinjacobs@swin.edu.au::1ae92db4-13e0-4387-a410-e0d0397dbc42" providerId="AD" clId="Web-{AADD8645-BC02-318B-82DD-CC37894FE605}" dt="2022-11-29T03:40:09.343" v="21" actId="20577"/>
+        <pc:sldMkLst>
+          <pc:docMk/>
+          <pc:sldMk cId="0" sldId="266"/>
+        </pc:sldMkLst>
+        <pc:spChg chg="mod">
+          <ac:chgData name="Colin Jacobs" userId="S::colinjacobs@swin.edu.au::1ae92db4-13e0-4387-a410-e0d0397dbc42" providerId="AD" clId="Web-{AADD8645-BC02-318B-82DD-CC37894FE605}" dt="2022-11-29T03:40:09.343" v="21" actId="20577"/>
+          <ac:spMkLst>
+            <pc:docMk/>
+            <pc:sldMk cId="0" sldId="266"/>
+            <ac:spMk id="128" creationId="{00000000-0000-0000-0000-000000000000}"/>
+          </ac:spMkLst>
+        </pc:spChg>
+      </pc:sldChg>
+      <pc:sldChg chg="delSp modSp">
+        <pc:chgData name="Colin Jacobs" userId="S::colinjacobs@swin.edu.au::1ae92db4-13e0-4387-a410-e0d0397dbc42" providerId="AD" clId="Web-{AADD8645-BC02-318B-82DD-CC37894FE605}" dt="2022-11-29T03:56:52.429" v="44"/>
+        <pc:sldMkLst>
+          <pc:docMk/>
+          <pc:sldMk cId="0" sldId="270"/>
+        </pc:sldMkLst>
+        <pc:spChg chg="del mod">
+          <ac:chgData name="Colin Jacobs" userId="S::colinjacobs@swin.edu.au::1ae92db4-13e0-4387-a410-e0d0397dbc42" providerId="AD" clId="Web-{AADD8645-BC02-318B-82DD-CC37894FE605}" dt="2022-11-29T03:56:50.616" v="43"/>
+          <ac:spMkLst>
+            <pc:docMk/>
+            <pc:sldMk cId="0" sldId="270"/>
+            <ac:spMk id="146" creationId="{00000000-0000-0000-0000-000000000000}"/>
+          </ac:spMkLst>
+        </pc:spChg>
+        <pc:spChg chg="del">
+          <ac:chgData name="Colin Jacobs" userId="S::colinjacobs@swin.edu.au::1ae92db4-13e0-4387-a410-e0d0397dbc42" providerId="AD" clId="Web-{AADD8645-BC02-318B-82DD-CC37894FE605}" dt="2022-11-29T03:56:52.429" v="44"/>
+          <ac:spMkLst>
+            <pc:docMk/>
+            <pc:sldMk cId="0" sldId="270"/>
+            <ac:spMk id="147" creationId="{00000000-0000-0000-0000-000000000000}"/>
+          </ac:spMkLst>
+        </pc:spChg>
+        <pc:picChg chg="mod ord">
+          <ac:chgData name="Colin Jacobs" userId="S::colinjacobs@swin.edu.au::1ae92db4-13e0-4387-a410-e0d0397dbc42" providerId="AD" clId="Web-{AADD8645-BC02-318B-82DD-CC37894FE605}" dt="2022-11-29T03:56:41.085" v="41"/>
+          <ac:picMkLst>
+            <pc:docMk/>
+            <pc:sldMk cId="0" sldId="270"/>
+            <ac:picMk id="148" creationId="{00000000-0000-0000-0000-000000000000}"/>
+          </ac:picMkLst>
+        </pc:picChg>
+      </pc:sldChg>
+      <pc:sldChg chg="modSp">
+        <pc:chgData name="Colin Jacobs" userId="S::colinjacobs@swin.edu.au::1ae92db4-13e0-4387-a410-e0d0397dbc42" providerId="AD" clId="Web-{AADD8645-BC02-318B-82DD-CC37894FE605}" dt="2022-11-29T03:58:44.838" v="59" actId="20577"/>
+        <pc:sldMkLst>
+          <pc:docMk/>
+          <pc:sldMk cId="0" sldId="271"/>
+        </pc:sldMkLst>
+        <pc:spChg chg="mod">
+          <ac:chgData name="Colin Jacobs" userId="S::colinjacobs@swin.edu.au::1ae92db4-13e0-4387-a410-e0d0397dbc42" providerId="AD" clId="Web-{AADD8645-BC02-318B-82DD-CC37894FE605}" dt="2022-11-29T03:58:44.838" v="59" actId="20577"/>
+          <ac:spMkLst>
+            <pc:docMk/>
+            <pc:sldMk cId="0" sldId="271"/>
+            <ac:spMk id="155" creationId="{00000000-0000-0000-0000-000000000000}"/>
+          </ac:spMkLst>
+        </pc:spChg>
+      </pc:sldChg>
+      <pc:sldChg chg="modSp">
+        <pc:chgData name="Colin Jacobs" userId="S::colinjacobs@swin.edu.au::1ae92db4-13e0-4387-a410-e0d0397dbc42" providerId="AD" clId="Web-{AADD8645-BC02-318B-82DD-CC37894FE605}" dt="2022-11-29T03:59:15.323" v="67" actId="20577"/>
+        <pc:sldMkLst>
+          <pc:docMk/>
+          <pc:sldMk cId="0" sldId="272"/>
+        </pc:sldMkLst>
+        <pc:spChg chg="mod">
+          <ac:chgData name="Colin Jacobs" userId="S::colinjacobs@swin.edu.au::1ae92db4-13e0-4387-a410-e0d0397dbc42" providerId="AD" clId="Web-{AADD8645-BC02-318B-82DD-CC37894FE605}" dt="2022-11-29T03:59:15.323" v="67" actId="20577"/>
+          <ac:spMkLst>
+            <pc:docMk/>
+            <pc:sldMk cId="0" sldId="272"/>
+            <ac:spMk id="159" creationId="{00000000-0000-0000-0000-000000000000}"/>
+          </ac:spMkLst>
+        </pc:spChg>
+        <pc:spChg chg="mod">
+          <ac:chgData name="Colin Jacobs" userId="S::colinjacobs@swin.edu.au::1ae92db4-13e0-4387-a410-e0d0397dbc42" providerId="AD" clId="Web-{AADD8645-BC02-318B-82DD-CC37894FE605}" dt="2022-11-29T03:59:04.760" v="64" actId="20577"/>
+          <ac:spMkLst>
+            <pc:docMk/>
+            <pc:sldMk cId="0" sldId="272"/>
+            <ac:spMk id="160" creationId="{00000000-0000-0000-0000-000000000000}"/>
+          </ac:spMkLst>
+        </pc:spChg>
+      </pc:sldChg>
+      <pc:sldChg chg="modSp">
+        <pc:chgData name="Colin Jacobs" userId="S::colinjacobs@swin.edu.au::1ae92db4-13e0-4387-a410-e0d0397dbc42" providerId="AD" clId="Web-{AADD8645-BC02-318B-82DD-CC37894FE605}" dt="2022-11-29T03:59:42.573" v="70" actId="20577"/>
+        <pc:sldMkLst>
+          <pc:docMk/>
+          <pc:sldMk cId="0" sldId="274"/>
+        </pc:sldMkLst>
+        <pc:spChg chg="mod">
+          <ac:chgData name="Colin Jacobs" userId="S::colinjacobs@swin.edu.au::1ae92db4-13e0-4387-a410-e0d0397dbc42" providerId="AD" clId="Web-{AADD8645-BC02-318B-82DD-CC37894FE605}" dt="2022-11-29T03:59:42.573" v="70" actId="20577"/>
+          <ac:spMkLst>
+            <pc:docMk/>
+            <pc:sldMk cId="0" sldId="274"/>
+            <ac:spMk id="167" creationId="{00000000-0000-0000-0000-000000000000}"/>
+          </ac:spMkLst>
+        </pc:spChg>
+      </pc:sldChg>
+      <pc:sldChg chg="modSp">
+        <pc:chgData name="Colin Jacobs" userId="S::colinjacobs@swin.edu.au::1ae92db4-13e0-4387-a410-e0d0397dbc42" providerId="AD" clId="Web-{AADD8645-BC02-318B-82DD-CC37894FE605}" dt="2022-11-29T04:00:02.324" v="80" actId="20577"/>
+        <pc:sldMkLst>
+          <pc:docMk/>
+          <pc:sldMk cId="0" sldId="275"/>
+        </pc:sldMkLst>
+        <pc:spChg chg="mod">
+          <ac:chgData name="Colin Jacobs" userId="S::colinjacobs@swin.edu.au::1ae92db4-13e0-4387-a410-e0d0397dbc42" providerId="AD" clId="Web-{AADD8645-BC02-318B-82DD-CC37894FE605}" dt="2022-11-29T04:00:02.324" v="80" actId="20577"/>
+          <ac:spMkLst>
+            <pc:docMk/>
+            <pc:sldMk cId="0" sldId="275"/>
+            <ac:spMk id="173" creationId="{00000000-0000-0000-0000-000000000000}"/>
+          </ac:spMkLst>
+        </pc:spChg>
+      </pc:sldChg>
+      <pc:sldChg chg="modSp">
+        <pc:chgData name="Colin Jacobs" userId="S::colinjacobs@swin.edu.au::1ae92db4-13e0-4387-a410-e0d0397dbc42" providerId="AD" clId="Web-{AADD8645-BC02-318B-82DD-CC37894FE605}" dt="2022-11-29T04:00:32.168" v="81" actId="14100"/>
+        <pc:sldMkLst>
+          <pc:docMk/>
+          <pc:sldMk cId="0" sldId="277"/>
+        </pc:sldMkLst>
+        <pc:spChg chg="mod">
+          <ac:chgData name="Colin Jacobs" userId="S::colinjacobs@swin.edu.au::1ae92db4-13e0-4387-a410-e0d0397dbc42" providerId="AD" clId="Web-{AADD8645-BC02-318B-82DD-CC37894FE605}" dt="2022-11-29T04:00:32.168" v="81" actId="14100"/>
+          <ac:spMkLst>
+            <pc:docMk/>
+            <pc:sldMk cId="0" sldId="277"/>
+            <ac:spMk id="181" creationId="{00000000-0000-0000-0000-000000000000}"/>
+          </ac:spMkLst>
+        </pc:spChg>
+      </pc:sldChg>
+      <pc:sldChg chg="addSp delSp modSp add replId">
+        <pc:chgData name="Colin Jacobs" userId="S::colinjacobs@swin.edu.au::1ae92db4-13e0-4387-a410-e0d0397dbc42" providerId="AD" clId="Web-{AADD8645-BC02-318B-82DD-CC37894FE605}" dt="2022-11-29T03:41:29.157" v="36" actId="20577"/>
+        <pc:sldMkLst>
+          <pc:docMk/>
+          <pc:sldMk cId="368310156" sldId="282"/>
+        </pc:sldMkLst>
+        <pc:spChg chg="mod">
+          <ac:chgData name="Colin Jacobs" userId="S::colinjacobs@swin.edu.au::1ae92db4-13e0-4387-a410-e0d0397dbc42" providerId="AD" clId="Web-{AADD8645-BC02-318B-82DD-CC37894FE605}" dt="2022-11-29T03:41:29.157" v="36" actId="20577"/>
+          <ac:spMkLst>
+            <pc:docMk/>
+            <pc:sldMk cId="368310156" sldId="282"/>
+            <ac:spMk id="184" creationId="{00000000-0000-0000-0000-000000000000}"/>
+          </ac:spMkLst>
+        </pc:spChg>
+        <pc:spChg chg="del mod">
+          <ac:chgData name="Colin Jacobs" userId="S::colinjacobs@swin.edu.au::1ae92db4-13e0-4387-a410-e0d0397dbc42" providerId="AD" clId="Web-{AADD8645-BC02-318B-82DD-CC37894FE605}" dt="2022-11-29T03:41:13.704" v="28"/>
+          <ac:spMkLst>
+            <pc:docMk/>
+            <pc:sldMk cId="368310156" sldId="282"/>
+            <ac:spMk id="185" creationId="{00000000-0000-0000-0000-000000000000}"/>
+          </ac:spMkLst>
+        </pc:spChg>
+        <pc:picChg chg="add mod">
+          <ac:chgData name="Colin Jacobs" userId="S::colinjacobs@swin.edu.au::1ae92db4-13e0-4387-a410-e0d0397dbc42" providerId="AD" clId="Web-{AADD8645-BC02-318B-82DD-CC37894FE605}" dt="2022-11-29T03:41:17.767" v="30" actId="1076"/>
+          <ac:picMkLst>
+            <pc:docMk/>
+            <pc:sldMk cId="368310156" sldId="282"/>
+            <ac:picMk id="2" creationId="{68E4C506-B74E-CF57-0525-2BE959A781A7}"/>
+          </ac:picMkLst>
+        </pc:picChg>
       </pc:sldChg>
     </pc:docChg>
   </pc:docChgLst>
@@ -1961,6 +2207,87 @@
                 <a:latin typeface="Calibri"/>
                 <a:cs typeface="Calibri"/>
               </a:rPr>
+              <a:t>Full program announced late August.</a:t>
+            </a:r>
+          </a:p>
+          <a:p>
+            <a:r>
+              <a:rPr lang="en-US" dirty="0">
+                <a:latin typeface="Calibri"/>
+                <a:cs typeface="Calibri"/>
+              </a:rPr>
+              <a:t>All require technical review for long range plane</a:t>
+            </a:r>
+          </a:p>
+        </p:txBody>
+      </p:sp>
+    </p:spTree>
+    <p:extLst>
+      <p:ext uri="{BB962C8B-B14F-4D97-AF65-F5344CB8AC3E}">
+        <p14:creationId xmlns:p14="http://schemas.microsoft.com/office/powerpoint/2010/main" val="3434470688"/>
+      </p:ext>
+    </p:extLst>
+  </p:cSld>
+  <p:clrMapOvr>
+    <a:masterClrMapping/>
+  </p:clrMapOvr>
+</p:notes>
+</file>
+
+<file path=ppt/notesSlides/notesSlide22.xml><?xml version="1.0" encoding="utf-8"?>
+<p:notes xmlns:a="http://schemas.openxmlformats.org/drawingml/2006/main" xmlns:r="http://schemas.openxmlformats.org/officeDocument/2006/relationships" xmlns:p="http://schemas.openxmlformats.org/presentationml/2006/main">
+  <p:cSld>
+    <p:spTree>
+      <p:nvGrpSpPr>
+        <p:cNvPr id="1" name=""/>
+        <p:cNvGrpSpPr/>
+        <p:nvPr/>
+      </p:nvGrpSpPr>
+      <p:grpSpPr>
+        <a:xfrm>
+          <a:off x="0" y="0"/>
+          <a:ext cx="0" cy="0"/>
+          <a:chOff x="0" y="0"/>
+          <a:chExt cx="0" cy="0"/>
+        </a:xfrm>
+      </p:grpSpPr>
+      <p:sp>
+        <p:nvSpPr>
+          <p:cNvPr id="2" name="Slide Image Placeholder 1"/>
+          <p:cNvSpPr>
+            <a:spLocks noGrp="1" noRot="1" noChangeAspect="1"/>
+          </p:cNvSpPr>
+          <p:nvPr>
+            <p:ph type="sldImg"/>
+          </p:nvPr>
+        </p:nvSpPr>
+        <p:spPr>
+          <a:xfrm>
+            <a:off x="381000" y="685800"/>
+            <a:ext cx="6096000" cy="3429000"/>
+          </a:xfrm>
+        </p:spPr>
+      </p:sp>
+      <p:sp>
+        <p:nvSpPr>
+          <p:cNvPr id="3" name="Notes Placeholder 2"/>
+          <p:cNvSpPr>
+            <a:spLocks noGrp="1"/>
+          </p:cNvSpPr>
+          <p:nvPr>
+            <p:ph type="body" idx="1"/>
+          </p:nvPr>
+        </p:nvSpPr>
+        <p:spPr/>
+        <p:txBody>
+          <a:bodyPr/>
+          <a:lstStyle/>
+          <a:p>
+            <a:r>
+              <a:rPr lang="en-US" dirty="0">
+                <a:latin typeface="Calibri"/>
+                <a:cs typeface="Calibri"/>
+              </a:rPr>
               <a:t>Users committee: open to extension of the deadline</a:t>
             </a:r>
           </a:p>
@@ -3179,7 +3506,7 @@
           </a:ln>
           <a:extLst>
             <a:ext uri="{C572A759-6A51-4108-AA02-DFA0A04FC94B}">
-              <ma14:wrappingTextBoxFlag xmlns:ma14="http://schemas.microsoft.com/office/mac/drawingml/2011/main" xmlns="" val="1"/>
+              <ma14:wrappingTextBoxFlag xmlns="" xmlns:ma14="http://schemas.microsoft.com/office/mac/drawingml/2011/main" val="1"/>
             </a:ext>
           </a:extLst>
         </p:spPr>
@@ -3676,7 +4003,7 @@
           </a:ln>
           <a:extLst>
             <a:ext uri="{C572A759-6A51-4108-AA02-DFA0A04FC94B}">
-              <ma14:wrappingTextBoxFlag xmlns:ma14="http://schemas.microsoft.com/office/mac/drawingml/2011/main" xmlns="" val="1"/>
+              <ma14:wrappingTextBoxFlag xmlns="" xmlns:ma14="http://schemas.microsoft.com/office/mac/drawingml/2011/main" val="1"/>
             </a:ext>
           </a:extLst>
         </p:spPr>
@@ -4465,7 +4792,7 @@
           </a:ln>
           <a:extLst>
             <a:ext uri="{C572A759-6A51-4108-AA02-DFA0A04FC94B}">
-              <ma14:wrappingTextBoxFlag xmlns:ma14="http://schemas.microsoft.com/office/mac/drawingml/2011/main" xmlns="" val="1"/>
+              <ma14:wrappingTextBoxFlag xmlns="" xmlns:ma14="http://schemas.microsoft.com/office/mac/drawingml/2011/main" val="1"/>
             </a:ext>
           </a:extLst>
         </p:spPr>
@@ -4662,7 +4989,7 @@
           </a:ln>
           <a:extLst>
             <a:ext uri="{C572A759-6A51-4108-AA02-DFA0A04FC94B}">
-              <ma14:wrappingTextBoxFlag xmlns:ma14="http://schemas.microsoft.com/office/mac/drawingml/2011/main" xmlns="" val="1"/>
+              <ma14:wrappingTextBoxFlag xmlns="" xmlns:ma14="http://schemas.microsoft.com/office/mac/drawingml/2011/main" val="1"/>
             </a:ext>
           </a:extLst>
         </p:spPr>
@@ -5636,7 +5963,7 @@
           </a:prstGeom>
           <a:extLst>
             <a:ext uri="{C572A759-6A51-4108-AA02-DFA0A04FC94B}">
-              <ma14:wrappingTextBoxFlag xmlns:ma14="http://schemas.microsoft.com/office/mac/drawingml/2011/main" xmlns="" val="1"/>
+              <ma14:wrappingTextBoxFlag xmlns="" xmlns:ma14="http://schemas.microsoft.com/office/mac/drawingml/2011/main" val="1"/>
             </a:ext>
           </a:extLst>
         </p:spPr>
@@ -6232,7 +6559,7 @@
           </a:prstGeom>
           <a:extLst>
             <a:ext uri="{C572A759-6A51-4108-AA02-DFA0A04FC94B}">
-              <ma14:wrappingTextBoxFlag xmlns:ma14="http://schemas.microsoft.com/office/mac/drawingml/2011/main" xmlns="" val="1"/>
+              <ma14:wrappingTextBoxFlag xmlns="" xmlns:ma14="http://schemas.microsoft.com/office/mac/drawingml/2011/main" val="1"/>
             </a:ext>
           </a:extLst>
         </p:spPr>
@@ -6268,7 +6595,7 @@
         </p:spPr>
         <p:txBody>
           <a:bodyPr lIns="50800" tIns="50800" rIns="50800" bIns="50800" anchor="t">
-            <a:normAutofit fontScale="92500"/>
+            <a:normAutofit/>
           </a:bodyPr>
           <a:lstStyle/>
           <a:p>
@@ -6433,7 +6760,15 @@
             </a:r>
             <a:r>
               <a:rPr sz="3650" dirty="0"/>
-              <a:t> in Cycle 1 will be limited to 8 disruptive (w/ turnaround less than 14 days) </a:t>
+              <a:t> in Cycle </a:t>
+            </a:r>
+            <a:r>
+              <a:rPr lang="en-US" sz="3650" dirty="0"/>
+              <a:t>2</a:t>
+            </a:r>
+            <a:r>
+              <a:rPr sz="3650" dirty="0"/>
+              <a:t> will be limited to 8 disruptive (w/ turnaround less than 14 days) </a:t>
             </a:r>
             <a:r>
               <a:rPr sz="3650" dirty="0" err="1"/>
@@ -6881,7 +7216,7 @@
           </a:prstGeom>
           <a:extLst>
             <a:ext uri="{C572A759-6A51-4108-AA02-DFA0A04FC94B}">
-              <ma14:wrappingTextBoxFlag xmlns:ma14="http://schemas.microsoft.com/office/mac/drawingml/2011/main" xmlns="" val="1"/>
+              <ma14:wrappingTextBoxFlag xmlns="" xmlns:ma14="http://schemas.microsoft.com/office/mac/drawingml/2011/main" val="1"/>
             </a:ext>
           </a:extLst>
         </p:spPr>
@@ -7317,7 +7652,7 @@
           </a:prstGeom>
           <a:extLst>
             <a:ext uri="{C572A759-6A51-4108-AA02-DFA0A04FC94B}">
-              <ma14:wrappingTextBoxFlag xmlns:ma14="http://schemas.microsoft.com/office/mac/drawingml/2011/main" xmlns="" val="1"/>
+              <ma14:wrappingTextBoxFlag xmlns="" xmlns:ma14="http://schemas.microsoft.com/office/mac/drawingml/2011/main" val="1"/>
             </a:ext>
           </a:extLst>
         </p:spPr>
@@ -7556,7 +7891,7 @@
           </a:prstGeom>
           <a:extLst>
             <a:ext uri="{C572A759-6A51-4108-AA02-DFA0A04FC94B}">
-              <ma14:wrappingTextBoxFlag xmlns:ma14="http://schemas.microsoft.com/office/mac/drawingml/2011/main" xmlns="" val="1"/>
+              <ma14:wrappingTextBoxFlag xmlns="" xmlns:ma14="http://schemas.microsoft.com/office/mac/drawingml/2011/main" val="1"/>
             </a:ext>
           </a:extLst>
         </p:spPr>
@@ -7769,6 +8104,33 @@
           <a:chExt cx="0" cy="0"/>
         </a:xfrm>
       </p:grpSpPr>
+      <p:pic>
+        <p:nvPicPr>
+          <p:cNvPr id="148" name="Image" descr="Image"/>
+          <p:cNvPicPr>
+            <a:picLocks noChangeAspect="1"/>
+          </p:cNvPicPr>
+          <p:nvPr/>
+        </p:nvPicPr>
+        <p:blipFill>
+          <a:blip r:embed="rId3"/>
+          <a:stretch>
+            <a:fillRect/>
+          </a:stretch>
+        </p:blipFill>
+        <p:spPr>
+          <a:xfrm>
+            <a:off x="3035510" y="2859255"/>
+            <a:ext cx="18369047" cy="8001001"/>
+          </a:xfrm>
+          <a:prstGeom prst="rect">
+            <a:avLst/>
+          </a:prstGeom>
+          <a:ln w="12700">
+            <a:miter lim="400000"/>
+          </a:ln>
+        </p:spPr>
+      </p:pic>
       <p:sp>
         <p:nvSpPr>
           <p:cNvPr id="143" name="Slide Number"/>
@@ -7785,7 +8147,7 @@
           </a:prstGeom>
           <a:extLst>
             <a:ext uri="{C572A759-6A51-4108-AA02-DFA0A04FC94B}">
-              <ma14:wrappingTextBoxFlag xmlns:ma14="http://schemas.microsoft.com/office/mac/drawingml/2011/main" xmlns="" val="1"/>
+              <ma14:wrappingTextBoxFlag xmlns="" xmlns:ma14="http://schemas.microsoft.com/office/mac/drawingml/2011/main" val="1"/>
             </a:ext>
           </a:extLst>
         </p:spPr>
@@ -7910,84 +8272,6 @@
       </p:sp>
       <p:sp>
         <p:nvSpPr>
-          <p:cNvPr id="146" name="Radio buttons"/>
-          <p:cNvSpPr txBox="1"/>
-          <p:nvPr/>
-        </p:nvSpPr>
-        <p:spPr>
-          <a:xfrm>
-            <a:off x="9213951" y="10960100"/>
-            <a:ext cx="2095501" cy="533401"/>
-          </a:xfrm>
-          <a:prstGeom prst="rect">
-            <a:avLst/>
-          </a:prstGeom>
-          <a:ln w="12700">
-            <a:miter lim="400000"/>
-          </a:ln>
-          <a:extLst>
-            <a:ext uri="{C572A759-6A51-4108-AA02-DFA0A04FC94B}">
-              <ma14:wrappingTextBoxFlag xmlns:ma14="http://schemas.microsoft.com/office/mac/drawingml/2011/main" xmlns="" val="1"/>
-            </a:ext>
-          </a:extLst>
-        </p:spPr>
-        <p:txBody>
-          <a:bodyPr wrap="none" lIns="50800" tIns="50800" rIns="50800" bIns="50800" anchor="ctr">
-            <a:spAutoFit/>
-          </a:bodyPr>
-          <a:lstStyle>
-            <a:lvl1pPr>
-              <a:defRPr sz="2500"/>
-            </a:lvl1pPr>
-          </a:lstStyle>
-          <a:p>
-            <a:r>
-              <a:t>Radio buttons</a:t>
-            </a:r>
-          </a:p>
-        </p:txBody>
-      </p:sp>
-      <p:sp>
-        <p:nvSpPr>
-          <p:cNvPr id="147" name="Optional - Radio buttons"/>
-          <p:cNvSpPr txBox="1"/>
-          <p:nvPr/>
-        </p:nvSpPr>
-        <p:spPr>
-          <a:xfrm>
-            <a:off x="15360752" y="10960100"/>
-            <a:ext cx="3623946" cy="533401"/>
-          </a:xfrm>
-          <a:prstGeom prst="rect">
-            <a:avLst/>
-          </a:prstGeom>
-          <a:ln w="12700">
-            <a:miter lim="400000"/>
-          </a:ln>
-          <a:extLst>
-            <a:ext uri="{C572A759-6A51-4108-AA02-DFA0A04FC94B}">
-              <ma14:wrappingTextBoxFlag xmlns:ma14="http://schemas.microsoft.com/office/mac/drawingml/2011/main" xmlns="" val="1"/>
-            </a:ext>
-          </a:extLst>
-        </p:spPr>
-        <p:txBody>
-          <a:bodyPr wrap="none" lIns="50800" tIns="50800" rIns="50800" bIns="50800" anchor="ctr">
-            <a:spAutoFit/>
-          </a:bodyPr>
-          <a:lstStyle>
-            <a:lvl1pPr>
-              <a:defRPr sz="2500"/>
-            </a:lvl1pPr>
-          </a:lstStyle>
-          <a:p>
-            <a:r>
-              <a:t>Optional - Radio buttons</a:t>
-            </a:r>
-          </a:p>
-        </p:txBody>
-      </p:sp>
-      <p:sp>
-        <p:nvSpPr>
           <p:cNvPr id="149" name="Archival…"/>
           <p:cNvSpPr txBox="1"/>
           <p:nvPr/>
@@ -8005,7 +8289,7 @@
           </a:ln>
           <a:extLst>
             <a:ext uri="{C572A759-6A51-4108-AA02-DFA0A04FC94B}">
-              <ma14:wrappingTextBoxFlag xmlns:ma14="http://schemas.microsoft.com/office/mac/drawingml/2011/main" xmlns="" val="1"/>
+              <ma14:wrappingTextBoxFlag xmlns="" xmlns:ma14="http://schemas.microsoft.com/office/mac/drawingml/2011/main" val="1"/>
             </a:ext>
           </a:extLst>
         </p:spPr>
@@ -8050,7 +8334,7 @@
           </a:ln>
           <a:extLst>
             <a:ext uri="{C572A759-6A51-4108-AA02-DFA0A04FC94B}">
-              <ma14:wrappingTextBoxFlag xmlns:ma14="http://schemas.microsoft.com/office/mac/drawingml/2011/main" xmlns="" val="1"/>
+              <ma14:wrappingTextBoxFlag xmlns="" xmlns:ma14="http://schemas.microsoft.com/office/mac/drawingml/2011/main" val="1"/>
             </a:ext>
           </a:extLst>
         </p:spPr>
@@ -8085,7 +8369,7 @@
           </a:ln>
           <a:extLst>
             <a:ext uri="{C572A759-6A51-4108-AA02-DFA0A04FC94B}">
-              <ma14:wrappingTextBoxFlag xmlns:ma14="http://schemas.microsoft.com/office/mac/drawingml/2011/main" xmlns="" val="1"/>
+              <ma14:wrappingTextBoxFlag xmlns="" xmlns:ma14="http://schemas.microsoft.com/office/mac/drawingml/2011/main" val="1"/>
             </a:ext>
           </a:extLst>
         </p:spPr>
@@ -8120,7 +8404,7 @@
           </a:ln>
           <a:extLst>
             <a:ext uri="{C572A759-6A51-4108-AA02-DFA0A04FC94B}">
-              <ma14:wrappingTextBoxFlag xmlns:ma14="http://schemas.microsoft.com/office/mac/drawingml/2011/main" xmlns="" val="1"/>
+              <ma14:wrappingTextBoxFlag xmlns="" xmlns:ma14="http://schemas.microsoft.com/office/mac/drawingml/2011/main" val="1"/>
             </a:ext>
           </a:extLst>
         </p:spPr>
@@ -8141,33 +8425,6 @@
           </a:p>
         </p:txBody>
       </p:sp>
-      <p:pic>
-        <p:nvPicPr>
-          <p:cNvPr id="148" name="Image" descr="Image"/>
-          <p:cNvPicPr>
-            <a:picLocks noChangeAspect="1"/>
-          </p:cNvPicPr>
-          <p:nvPr/>
-        </p:nvPicPr>
-        <p:blipFill>
-          <a:blip r:embed="rId3"/>
-          <a:stretch>
-            <a:fillRect/>
-          </a:stretch>
-        </p:blipFill>
-        <p:spPr>
-          <a:xfrm>
-            <a:off x="3007518" y="2929235"/>
-            <a:ext cx="18369047" cy="8001001"/>
-          </a:xfrm>
-          <a:prstGeom prst="rect">
-            <a:avLst/>
-          </a:prstGeom>
-          <a:ln w="12700">
-            <a:miter lim="400000"/>
-          </a:ln>
-        </p:spPr>
-      </p:pic>
     </p:spTree>
   </p:cSld>
   <p:clrMapOvr>
@@ -8210,7 +8467,7 @@
           </a:prstGeom>
           <a:extLst>
             <a:ext uri="{C572A759-6A51-4108-AA02-DFA0A04FC94B}">
-              <ma14:wrappingTextBoxFlag xmlns:ma14="http://schemas.microsoft.com/office/mac/drawingml/2011/main" xmlns="" val="1"/>
+              <ma14:wrappingTextBoxFlag xmlns="" xmlns:ma14="http://schemas.microsoft.com/office/mac/drawingml/2011/main" val="1"/>
             </a:ext>
           </a:extLst>
         </p:spPr>
@@ -8241,10 +8498,12 @@
           </a:prstGeom>
         </p:spPr>
         <p:txBody>
-          <a:bodyPr/>
+          <a:bodyPr lIns="50800" tIns="50800" rIns="50800" bIns="50800" anchor="t">
+            <a:normAutofit/>
+          </a:bodyPr>
           <a:lstStyle/>
           <a:p>
-            <a:pPr marL="77735" indent="-77735" defTabSz="214884">
+            <a:pPr marL="77470" indent="-77470" defTabSz="214884">
               <a:lnSpc>
                 <a:spcPts val="6800"/>
               </a:lnSpc>
@@ -8270,9 +8529,10 @@
               <a:rPr dirty="0"/>
               <a:t>Observations that are no longer in the exclusive access periods are freely available for analysis and are retrieved through MAST.</a:t>
             </a:r>
-          </a:p>
-          <a:p>
-            <a:pPr marL="77735" indent="-77735" defTabSz="214884">
+            <a:endParaRPr lang="en-US"/>
+          </a:p>
+          <a:p>
+            <a:pPr marL="77470" indent="-77470" defTabSz="214884">
               <a:lnSpc>
                 <a:spcPts val="6800"/>
               </a:lnSpc>
@@ -8297,7 +8557,7 @@
             <a:endParaRPr dirty="0"/>
           </a:p>
           <a:p>
-            <a:pPr marL="77735" lvl="2" indent="-77735" defTabSz="214884">
+            <a:pPr marL="77470" lvl="2" indent="-77470" defTabSz="214884">
               <a:lnSpc>
                 <a:spcPts val="6800"/>
               </a:lnSpc>
@@ -8321,12 +8581,28 @@
               </a:defRPr>
             </a:pPr>
             <a:r>
-              <a:rPr dirty="0"/>
-              <a:t>For Cycle 1 this will include DD Early Release Science (ERS) datasets, which have no exclusive access periods, and some GTO datasets that will be made public. </a:t>
-            </a:r>
-          </a:p>
-          <a:p>
-            <a:pPr marL="77735" lvl="2" indent="-77735" defTabSz="214884">
+              <a:rPr sz="4150" dirty="0"/>
+              <a:t>For Cycle 1 this </a:t>
+            </a:r>
+            <a:r>
+              <a:rPr lang="en-US" sz="4150" dirty="0"/>
+              <a:t>included</a:t>
+            </a:r>
+            <a:r>
+              <a:rPr sz="4150" dirty="0"/>
+              <a:t> DD Early Release Science (ERS) datasets, which have no exclusive access periods, and some GTO datasets that will be made public.</a:t>
+            </a:r>
+            <a:r>
+              <a:rPr lang="en-US" sz="4150" dirty="0"/>
+              <a:t> </a:t>
+            </a:r>
+            <a:endParaRPr lang="en-US" sz="4150" dirty="0">
+              <a:ea typeface="+mn-lt"/>
+              <a:cs typeface="+mn-lt"/>
+            </a:endParaRPr>
+          </a:p>
+          <a:p>
+            <a:pPr marL="77470" lvl="2" indent="-77470" defTabSz="214884">
               <a:lnSpc>
                 <a:spcPts val="6800"/>
               </a:lnSpc>
@@ -8349,10 +8625,17 @@
                 <a:sym typeface="Avenir Light"/>
               </a:defRPr>
             </a:pPr>
-            <a:endParaRPr dirty="0"/>
-          </a:p>
-          <a:p>
-            <a:pPr marL="77735" lvl="2" indent="-77735" defTabSz="214884">
+            <a:r>
+              <a:rPr lang="en-US" sz="4150" dirty="0">
+                <a:ea typeface="+mn-lt"/>
+                <a:cs typeface="+mn-lt"/>
+              </a:rPr>
+              <a:t>For Cycle 2, this includes all Director's Discretionary Early Release Science datasets, which have no exclusive access period, and some approved GTO program datasets. </a:t>
+            </a:r>
+            <a:endParaRPr lang="en-US" sz="4150" dirty="0"/>
+          </a:p>
+          <a:p>
+            <a:pPr marL="77470" lvl="2" indent="-77470" defTabSz="214884">
               <a:lnSpc>
                 <a:spcPts val="6800"/>
               </a:lnSpc>
@@ -8383,7 +8666,6 @@
               <a:latin typeface="Times"/>
               <a:ea typeface="Times"/>
               <a:cs typeface="Times"/>
-              <a:sym typeface="Times"/>
             </a:endParaRPr>
           </a:p>
           <a:p>
@@ -8684,7 +8966,7 @@
           </a:prstGeom>
           <a:extLst>
             <a:ext uri="{C572A759-6A51-4108-AA02-DFA0A04FC94B}">
-              <ma14:wrappingTextBoxFlag xmlns:ma14="http://schemas.microsoft.com/office/mac/drawingml/2011/main" xmlns="" val="1"/>
+              <ma14:wrappingTextBoxFlag xmlns="" xmlns:ma14="http://schemas.microsoft.com/office/mac/drawingml/2011/main" val="1"/>
             </a:ext>
           </a:extLst>
         </p:spPr>
@@ -8720,12 +9002,12 @@
           </a:prstGeom>
         </p:spPr>
         <p:txBody>
-          <a:bodyPr>
-            <a:normAutofit fontScale="92500"/>
+          <a:bodyPr lIns="50800" tIns="50800" rIns="50800" bIns="50800" anchor="t">
+            <a:normAutofit/>
           </a:bodyPr>
           <a:lstStyle/>
           <a:p>
-            <a:pPr marL="101599" indent="-101599" defTabSz="182880">
+            <a:pPr marL="100965" indent="-100965" defTabSz="182880">
               <a:lnSpc>
                 <a:spcPts val="7500"/>
               </a:lnSpc>
@@ -8774,9 +9056,10 @@
               </a:rPr>
               <a:t> analyze a specific subset of JWST data to address a specific science issue not addressed by the original program. Awards will be typically less than $150,000 with a median of $75,000.</a:t>
             </a:r>
-          </a:p>
-          <a:p>
-            <a:pPr marL="101599" indent="-101599" defTabSz="182880">
+            <a:endParaRPr lang="en-US"/>
+          </a:p>
+          <a:p>
+            <a:pPr marL="100965" indent="-100965" defTabSz="182880">
               <a:lnSpc>
                 <a:spcPts val="7500"/>
               </a:lnSpc>
@@ -8801,7 +9084,7 @@
               </a:defRPr>
             </a:pPr>
             <a:r>
-              <a:rPr dirty="0">
+              <a:rPr sz="4950" dirty="0">
                 <a:solidFill>
                   <a:schemeClr val="accent2">
                     <a:lumOff val="10634"/>
@@ -8815,7 +9098,7 @@
               <a:t>Legacy AR proposals</a:t>
             </a:r>
             <a:r>
-              <a:rPr dirty="0">
+              <a:rPr sz="4950" dirty="0">
                 <a:solidFill>
                   <a:schemeClr val="accent2">
                     <a:lumOff val="10634"/>
@@ -8825,7 +9108,7 @@
               <a:t> </a:t>
             </a:r>
             <a:r>
-              <a:rPr dirty="0">
+              <a:rPr sz="4950" dirty="0">
                 <a:solidFill>
                   <a:schemeClr val="accent5">
                     <a:hueOff val="-8881752"/>
@@ -8833,11 +9116,33 @@
                   </a:schemeClr>
                 </a:solidFill>
               </a:rPr>
-              <a:t>differ in that they provide a homogeneous set of calibrated data or data products to the scientific community. Award will be a minimum of $150.000.</a:t>
-            </a:r>
-          </a:p>
-          <a:p>
-            <a:pPr marL="101599" indent="-101599" defTabSz="182880">
+              <a:t>differ in that they provide a homogeneous set of calibrated data or data products to the scientific community. Award will be a minimum of $</a:t>
+            </a:r>
+            <a:r>
+              <a:rPr lang="en-US" sz="4950" dirty="0">
+                <a:solidFill>
+                  <a:schemeClr val="accent5">
+                    <a:hueOff val="-8881752"/>
+                    <a:lumOff val="-12984"/>
+                  </a:schemeClr>
+                </a:solidFill>
+              </a:rPr>
+              <a:t>150,000</a:t>
+            </a:r>
+            <a:r>
+              <a:rPr sz="4950" dirty="0">
+                <a:solidFill>
+                  <a:schemeClr val="accent5">
+                    <a:hueOff val="-8881752"/>
+                    <a:lumOff val="-12984"/>
+                  </a:schemeClr>
+                </a:solidFill>
+              </a:rPr>
+              <a:t>.</a:t>
+            </a:r>
+          </a:p>
+          <a:p>
+            <a:pPr marL="100965" indent="-100965" defTabSz="182880">
               <a:lnSpc>
                 <a:spcPts val="7500"/>
               </a:lnSpc>
@@ -8906,7 +9211,7 @@
             </a:endParaRPr>
           </a:p>
           <a:p>
-            <a:pPr marL="66157" lvl="2" indent="-66157" defTabSz="182880">
+            <a:pPr marL="66040" lvl="2" indent="-66040" defTabSz="182880">
               <a:lnSpc>
                 <a:spcPts val="5800"/>
               </a:lnSpc>
@@ -8933,7 +9238,6 @@
               <a:latin typeface="Times"/>
               <a:ea typeface="Times"/>
               <a:cs typeface="Times"/>
-              <a:sym typeface="Times"/>
             </a:endParaRPr>
           </a:p>
           <a:p>
@@ -9178,7 +9482,7 @@
               </a:defRPr>
             </a:pPr>
             <a:r>
-              <a:rPr dirty="0">
+              <a:rPr sz="4900" dirty="0">
                 <a:solidFill>
                   <a:schemeClr val="accent1">
                     <a:lumMod val="75000"/>
@@ -9189,7 +9493,7 @@
               <a:t>Archival Research (AR) Proposals - US funding</a:t>
             </a:r>
             <a:r>
-              <a:rPr lang="en-AU" dirty="0">
+              <a:rPr lang="en-AU" sz="4900" dirty="0">
                 <a:solidFill>
                   <a:schemeClr val="accent1">
                     <a:lumMod val="75000"/>
@@ -9197,9 +9501,52 @@
                 </a:solidFill>
                 <a:latin typeface="+mn-ea"/>
               </a:rPr>
-              <a:t> (from Cycle 1)</a:t>
-            </a:r>
-            <a:endParaRPr dirty="0">
+              <a:t> </a:t>
+            </a:r>
+            <a:br>
+              <a:rPr lang="en-AU" sz="4900" dirty="0">
+                <a:solidFill>
+                  <a:schemeClr val="accent1">
+                    <a:lumMod val="75000"/>
+                  </a:schemeClr>
+                </a:solidFill>
+                <a:latin typeface="+mn-ea"/>
+              </a:rPr>
+            </a:br>
+            <a:r>
+              <a:rPr sz="3600" dirty="0">
+                <a:solidFill>
+                  <a:schemeClr val="accent1">
+                    <a:lumMod val="75000"/>
+                  </a:schemeClr>
+                </a:solidFill>
+                <a:latin typeface="+mn-ea"/>
+              </a:rPr>
+              <a:t>This is for information only, as </a:t>
+            </a:r>
+            <a:r>
+              <a:rPr lang="en-US" sz="3600" dirty="0">
+                <a:solidFill>
+                  <a:schemeClr val="accent1">
+                    <a:lumMod val="75000"/>
+                  </a:schemeClr>
+                </a:solidFill>
+                <a:latin typeface="+mn-ea"/>
+              </a:rPr>
+              <a:t>Australian Astronomers</a:t>
+            </a:r>
+            <a:r>
+              <a:rPr sz="3600" dirty="0">
+                <a:solidFill>
+                  <a:schemeClr val="accent1">
+                    <a:lumMod val="75000"/>
+                  </a:schemeClr>
+                </a:solidFill>
+                <a:latin typeface="+mn-ea"/>
+              </a:rPr>
+              <a:t> do not have access to US funding</a:t>
+            </a:r>
+            <a:endParaRPr lang="en-US" sz="4945" dirty="0">
               <a:solidFill>
                 <a:schemeClr val="accent1">
                   <a:lumMod val="75000"/>
@@ -9207,32 +9554,6 @@
               </a:solidFill>
               <a:latin typeface="+mn-ea"/>
             </a:endParaRPr>
-          </a:p>
-          <a:p>
-            <a:pPr defTabSz="354965">
-              <a:defRPr sz="3612">
-                <a:solidFill>
-                  <a:schemeClr val="accent2">
-                    <a:lumOff val="10634"/>
-                  </a:schemeClr>
-                </a:solidFill>
-                <a:latin typeface="Avenir Heavy"/>
-                <a:ea typeface="Avenir Heavy"/>
-                <a:cs typeface="Avenir Heavy"/>
-                <a:sym typeface="Avenir Heavy"/>
-              </a:defRPr>
-            </a:pPr>
-            <a:r>
-              <a:rPr dirty="0">
-                <a:solidFill>
-                  <a:schemeClr val="accent1">
-                    <a:lumMod val="75000"/>
-                  </a:schemeClr>
-                </a:solidFill>
-                <a:latin typeface="+mn-ea"/>
-              </a:rPr>
-              <a:t>This is for information only, as European Astronomers do not have access to US funding</a:t>
-            </a:r>
           </a:p>
         </p:txBody>
       </p:sp>
@@ -9278,7 +9599,7 @@
           </a:prstGeom>
           <a:extLst>
             <a:ext uri="{C572A759-6A51-4108-AA02-DFA0A04FC94B}">
-              <ma14:wrappingTextBoxFlag xmlns:ma14="http://schemas.microsoft.com/office/mac/drawingml/2011/main" xmlns="" val="1"/>
+              <ma14:wrappingTextBoxFlag xmlns="" xmlns:ma14="http://schemas.microsoft.com/office/mac/drawingml/2011/main" val="1"/>
             </a:ext>
           </a:extLst>
         </p:spPr>
@@ -9784,7 +10105,7 @@
           </a:prstGeom>
           <a:extLst>
             <a:ext uri="{C572A759-6A51-4108-AA02-DFA0A04FC94B}">
-              <ma14:wrappingTextBoxFlag xmlns:ma14="http://schemas.microsoft.com/office/mac/drawingml/2011/main" xmlns="" val="1"/>
+              <ma14:wrappingTextBoxFlag xmlns="" xmlns:ma14="http://schemas.microsoft.com/office/mac/drawingml/2011/main" val="1"/>
             </a:ext>
           </a:extLst>
         </p:spPr>
@@ -9820,10 +10141,12 @@
           </a:prstGeom>
         </p:spPr>
         <p:txBody>
-          <a:bodyPr/>
+          <a:bodyPr lIns="50800" tIns="50800" rIns="50800" bIns="50800" anchor="t">
+            <a:normAutofit/>
+          </a:bodyPr>
           <a:lstStyle/>
           <a:p>
-            <a:pPr marL="101599" indent="-101599" defTabSz="182880">
+            <a:pPr marL="100965" indent="-100965" defTabSz="182880">
               <a:lnSpc>
                 <a:spcPts val="6800"/>
               </a:lnSpc>
@@ -9882,9 +10205,10 @@
               <a:rPr dirty="0"/>
               <a:t> time allocations. A substantial fraction has already been given to DD ERS programs. </a:t>
             </a:r>
-          </a:p>
-          <a:p>
-            <a:pPr marL="101599" indent="-101599" defTabSz="182880">
+            <a:endParaRPr lang="en-US"/>
+          </a:p>
+          <a:p>
+            <a:pPr marL="100965" indent="-100965" defTabSz="182880">
               <a:lnSpc>
                 <a:spcPts val="6800"/>
               </a:lnSpc>
@@ -9912,7 +10236,7 @@
               </a:defRPr>
             </a:pPr>
             <a:r>
-              <a:rPr dirty="0">
+              <a:rPr sz="4400" dirty="0">
                 <a:solidFill>
                   <a:schemeClr val="accent2">
                     <a:lumOff val="10634"/>
@@ -9926,7 +10250,7 @@
               <a:t>DD proposals</a:t>
             </a:r>
             <a:r>
-              <a:rPr dirty="0">
+              <a:rPr sz="4400" dirty="0">
                 <a:latin typeface="Avenir Heavy"/>
                 <a:ea typeface="Avenir Heavy"/>
                 <a:cs typeface="Avenir Heavy"/>
@@ -9935,20 +10259,29 @@
               <a:t> </a:t>
             </a:r>
             <a:r>
-              <a:rPr dirty="0"/>
+              <a:rPr sz="4400" dirty="0"/>
               <a:t>allow the timely follow-up of transient phenomena or other new discoveries that could not have been plausibly proposed for in response to the Cycle </a:t>
             </a:r>
             <a:r>
-              <a:rPr lang="en-AU" dirty="0"/>
+              <a:rPr lang="en-AU" sz="4400" dirty="0"/>
               <a:t>2</a:t>
             </a:r>
             <a:r>
-              <a:rPr dirty="0"/>
-              <a:t> call. </a:t>
-            </a:r>
-          </a:p>
-          <a:p>
-            <a:pPr marL="101599" indent="-101599" defTabSz="182880">
+              <a:rPr lang="en-US" sz="4400" dirty="0"/>
+              <a:t> </a:t>
+            </a:r>
+            <a:r>
+              <a:rPr sz="4400" dirty="0"/>
+              <a:t>call.</a:t>
+            </a:r>
+            <a:r>
+              <a:rPr lang="en-US" sz="4400" dirty="0"/>
+              <a:t> </a:t>
+            </a:r>
+            <a:endParaRPr sz="4400" dirty="0"/>
+          </a:p>
+          <a:p>
+            <a:pPr marL="100965" indent="-100965" defTabSz="182880">
               <a:lnSpc>
                 <a:spcPts val="6800"/>
               </a:lnSpc>
@@ -10004,7 +10337,7 @@
             <a:endParaRPr sz="480" dirty="0"/>
           </a:p>
           <a:p>
-            <a:pPr marL="101599" indent="-101599" defTabSz="182880">
+            <a:pPr marL="100965" indent="-100965" defTabSz="182880">
               <a:lnSpc>
                 <a:spcPts val="5000"/>
               </a:lnSpc>
@@ -10034,7 +10367,7 @@
             <a:endParaRPr sz="480" dirty="0"/>
           </a:p>
           <a:p>
-            <a:pPr marL="30506" indent="-30506" defTabSz="182880">
+            <a:pPr marL="30480" indent="-30480" defTabSz="182880">
               <a:lnSpc>
                 <a:spcPts val="3300"/>
               </a:lnSpc>
@@ -10064,7 +10397,7 @@
             <a:endParaRPr sz="480" dirty="0"/>
           </a:p>
           <a:p>
-            <a:pPr marL="66157" lvl="2" indent="-66157" defTabSz="182880">
+            <a:pPr marL="66040" lvl="2" indent="-66040" defTabSz="182880">
               <a:lnSpc>
                 <a:spcPts val="5800"/>
               </a:lnSpc>
@@ -10499,7 +10832,7 @@
           </a:prstGeom>
           <a:extLst>
             <a:ext uri="{C572A759-6A51-4108-AA02-DFA0A04FC94B}">
-              <ma14:wrappingTextBoxFlag xmlns:ma14="http://schemas.microsoft.com/office/mac/drawingml/2011/main" xmlns="" val="1"/>
+              <ma14:wrappingTextBoxFlag xmlns="" xmlns:ma14="http://schemas.microsoft.com/office/mac/drawingml/2011/main" val="1"/>
             </a:ext>
           </a:extLst>
         </p:spPr>
@@ -10597,8 +10930,8 @@
         </p:nvSpPr>
         <p:spPr>
           <a:xfrm>
-            <a:off x="2856882" y="6904193"/>
-            <a:ext cx="18670236" cy="5089214"/>
+            <a:off x="2856882" y="7597652"/>
+            <a:ext cx="18670236" cy="3702296"/>
           </a:xfrm>
           <a:prstGeom prst="rect">
             <a:avLst/>
@@ -10608,7 +10941,7 @@
           </a:ln>
           <a:extLst>
             <a:ext uri="{C572A759-6A51-4108-AA02-DFA0A04FC94B}">
-              <ma14:wrappingTextBoxFlag xmlns:ma14="http://schemas.microsoft.com/office/mac/drawingml/2011/main" xmlns="" val="1"/>
+              <ma14:wrappingTextBoxFlag xmlns="" xmlns:ma14="http://schemas.microsoft.com/office/mac/drawingml/2011/main" val="1"/>
             </a:ext>
           </a:extLst>
         </p:spPr>
@@ -10618,7 +10951,7 @@
           </a:bodyPr>
           <a:lstStyle/>
           <a:p>
-            <a:pPr marL="493884" indent="-493884" defTabSz="457200">
+            <a:pPr marL="493395" indent="-493395" defTabSz="457200">
               <a:lnSpc>
                 <a:spcPts val="9600"/>
               </a:lnSpc>
@@ -10644,9 +10977,10 @@
               <a:rPr sz="3200" dirty="0"/>
               <a:t>STScI uses a dual anonymous proposal review for both JWST and HST.</a:t>
             </a:r>
-          </a:p>
-          <a:p>
-            <a:pPr marL="493884" indent="-493884" defTabSz="457200">
+            <a:endParaRPr lang="en-US"/>
+          </a:p>
+          <a:p>
+            <a:pPr marL="493395" indent="-493395" defTabSz="457200">
               <a:lnSpc>
                 <a:spcPts val="9600"/>
               </a:lnSpc>
@@ -10674,7 +11008,7 @@
             </a:r>
           </a:p>
           <a:p>
-            <a:pPr marL="493884" indent="-493884" defTabSz="457200">
+            <a:pPr marL="493395" indent="-493395" defTabSz="457200">
               <a:lnSpc>
                 <a:spcPts val="10700"/>
               </a:lnSpc>
@@ -10698,8 +11032,17 @@
             </a:pPr>
             <a:r>
               <a:rPr sz="3200" dirty="0"/>
-              <a:t>This requires thought in crafting proposals (see presentation on “Tips on How to Write a Successful Proposal”).</a:t>
-            </a:r>
+              <a:t>This requires thought in crafting proposals (see </a:t>
+            </a:r>
+            <a:r>
+              <a:rPr lang="en-US" sz="3200" dirty="0"/>
+              <a:t>notes on</a:t>
+            </a:r>
+            <a:r>
+              <a:rPr sz="3200" dirty="0"/>
+              <a:t> “Tips on How to Write a Successful Proposal”).</a:t>
+            </a:r>
+            <a:endParaRPr sz="4700"/>
           </a:p>
         </p:txBody>
       </p:sp>
@@ -10745,7 +11088,7 @@
           </a:prstGeom>
           <a:extLst>
             <a:ext uri="{C572A759-6A51-4108-AA02-DFA0A04FC94B}">
-              <ma14:wrappingTextBoxFlag xmlns:ma14="http://schemas.microsoft.com/office/mac/drawingml/2011/main" xmlns="" val="1"/>
+              <ma14:wrappingTextBoxFlag xmlns="" xmlns:ma14="http://schemas.microsoft.com/office/mac/drawingml/2011/main" val="1"/>
             </a:ext>
           </a:extLst>
         </p:spPr>
@@ -10827,7 +11170,7 @@
           </a:ln>
           <a:extLst>
             <a:ext uri="{C572A759-6A51-4108-AA02-DFA0A04FC94B}">
-              <ma14:wrappingTextBoxFlag xmlns:ma14="http://schemas.microsoft.com/office/mac/drawingml/2011/main" xmlns="" val="1"/>
+              <ma14:wrappingTextBoxFlag xmlns="" xmlns:ma14="http://schemas.microsoft.com/office/mac/drawingml/2011/main" val="1"/>
             </a:ext>
           </a:extLst>
         </p:spPr>
@@ -11054,7 +11397,7 @@
           </a:prstGeom>
           <a:extLst>
             <a:ext uri="{C572A759-6A51-4108-AA02-DFA0A04FC94B}">
-              <ma14:wrappingTextBoxFlag xmlns:ma14="http://schemas.microsoft.com/office/mac/drawingml/2011/main" xmlns="" val="1"/>
+              <ma14:wrappingTextBoxFlag xmlns="" xmlns:ma14="http://schemas.microsoft.com/office/mac/drawingml/2011/main" val="1"/>
             </a:ext>
           </a:extLst>
         </p:spPr>
@@ -11125,8 +11468,8 @@
         </p:nvSpPr>
         <p:spPr>
           <a:xfrm>
-            <a:off x="2374282" y="3987800"/>
-            <a:ext cx="18670236" cy="5740401"/>
+            <a:off x="2374282" y="3622566"/>
+            <a:ext cx="18515014" cy="6682535"/>
           </a:xfrm>
           <a:prstGeom prst="rect">
             <a:avLst/>
@@ -11136,12 +11479,12 @@
           </a:ln>
           <a:extLst>
             <a:ext uri="{C572A759-6A51-4108-AA02-DFA0A04FC94B}">
-              <ma14:wrappingTextBoxFlag xmlns:ma14="http://schemas.microsoft.com/office/mac/drawingml/2011/main" xmlns="" val="1"/>
+              <ma14:wrappingTextBoxFlag xmlns="" xmlns:ma14="http://schemas.microsoft.com/office/mac/drawingml/2011/main" val="1"/>
             </a:ext>
           </a:extLst>
         </p:spPr>
         <p:txBody>
-          <a:bodyPr lIns="50800" tIns="50800" rIns="50800" bIns="50800" anchor="ctr">
+          <a:bodyPr wrap="square" lIns="50800" tIns="50800" rIns="50800" bIns="50800" anchor="ctr">
             <a:spAutoFit/>
           </a:bodyPr>
           <a:lstStyle/>
@@ -11239,7 +11582,7 @@
           </a:prstGeom>
           <a:extLst>
             <a:ext uri="{C572A759-6A51-4108-AA02-DFA0A04FC94B}">
-              <ma14:wrappingTextBoxFlag xmlns:ma14="http://schemas.microsoft.com/office/mac/drawingml/2011/main" xmlns="" val="1"/>
+              <ma14:wrappingTextBoxFlag xmlns="" xmlns:ma14="http://schemas.microsoft.com/office/mac/drawingml/2011/main" val="1"/>
             </a:ext>
           </a:extLst>
         </p:spPr>
@@ -11322,7 +11665,7 @@
           </a:ln>
           <a:extLst>
             <a:ext uri="{C572A759-6A51-4108-AA02-DFA0A04FC94B}">
-              <ma14:wrappingTextBoxFlag xmlns:ma14="http://schemas.microsoft.com/office/mac/drawingml/2011/main" xmlns="" val="1"/>
+              <ma14:wrappingTextBoxFlag xmlns="" xmlns:ma14="http://schemas.microsoft.com/office/mac/drawingml/2011/main" val="1"/>
             </a:ext>
           </a:extLst>
         </p:spPr>
@@ -11656,6 +11999,156 @@
 </file>
 
 <file path=ppt/slides/slide24.xml><?xml version="1.0" encoding="utf-8"?>
+<p:sld xmlns:a="http://schemas.openxmlformats.org/drawingml/2006/main" xmlns:r="http://schemas.openxmlformats.org/officeDocument/2006/relationships" xmlns:p="http://schemas.openxmlformats.org/presentationml/2006/main">
+  <p:cSld>
+    <p:spTree>
+      <p:nvGrpSpPr>
+        <p:cNvPr id="1" name=""/>
+        <p:cNvGrpSpPr/>
+        <p:nvPr/>
+      </p:nvGrpSpPr>
+      <p:grpSpPr>
+        <a:xfrm>
+          <a:off x="0" y="0"/>
+          <a:ext cx="0" cy="0"/>
+          <a:chOff x="0" y="0"/>
+          <a:chExt cx="0" cy="0"/>
+        </a:xfrm>
+      </p:grpSpPr>
+      <p:sp>
+        <p:nvSpPr>
+          <p:cNvPr id="183" name="Slide Number"/>
+          <p:cNvSpPr>
+            <a:spLocks noGrp="1"/>
+          </p:cNvSpPr>
+          <p:nvPr>
+            <p:ph type="sldNum" sz="quarter" idx="2"/>
+          </p:nvPr>
+        </p:nvSpPr>
+        <p:spPr>
+          <a:prstGeom prst="rect">
+            <a:avLst/>
+          </a:prstGeom>
+          <a:extLst>
+            <a:ext uri="{C572A759-6A51-4108-AA02-DFA0A04FC94B}">
+              <ma14:wrappingTextBoxFlag xmlns:ma14="http://schemas.microsoft.com/office/mac/drawingml/2011/main" xmlns="" val="1"/>
+            </a:ext>
+          </a:extLst>
+        </p:spPr>
+        <p:txBody>
+          <a:bodyPr/>
+          <a:lstStyle/>
+          <a:p>
+            <a:fld id="{86CB4B4D-7CA3-9044-876B-883B54F8677D}" type="slidenum">
+              <a:rPr/>
+              <a:t>24</a:t>
+            </a:fld>
+            <a:endParaRPr/>
+          </a:p>
+        </p:txBody>
+      </p:sp>
+      <p:sp>
+        <p:nvSpPr>
+          <p:cNvPr id="184" name="Proposal Review Process"/>
+          <p:cNvSpPr>
+            <a:spLocks noGrp="1"/>
+          </p:cNvSpPr>
+          <p:nvPr>
+            <p:ph type="title"/>
+          </p:nvPr>
+        </p:nvSpPr>
+        <p:spPr>
+          <a:prstGeom prst="rect">
+            <a:avLst/>
+          </a:prstGeom>
+        </p:spPr>
+        <p:txBody>
+          <a:bodyPr/>
+          <a:lstStyle>
+            <a:lvl1pPr>
+              <a:defRPr>
+                <a:solidFill>
+                  <a:schemeClr val="accent2">
+                    <a:lumOff val="10634"/>
+                  </a:schemeClr>
+                </a:solidFill>
+                <a:latin typeface="Avenir Heavy"/>
+                <a:ea typeface="Avenir Heavy"/>
+                <a:cs typeface="Avenir Heavy"/>
+                <a:sym typeface="Avenir Heavy"/>
+              </a:defRPr>
+            </a:lvl1pPr>
+          </a:lstStyle>
+          <a:p>
+            <a:r>
+              <a:rPr lang="en-US" dirty="0">
+                <a:solidFill>
+                  <a:schemeClr val="accent1">
+                    <a:lumMod val="75000"/>
+                  </a:schemeClr>
+                </a:solidFill>
+                <a:latin typeface="+mn-ea"/>
+                <a:ea typeface="+mn-ea"/>
+              </a:rPr>
+              <a:t>Timeline summary</a:t>
+            </a:r>
+            <a:endParaRPr dirty="0">
+              <a:solidFill>
+                <a:schemeClr val="accent1">
+                  <a:lumMod val="75000"/>
+                </a:schemeClr>
+              </a:solidFill>
+              <a:latin typeface="+mn-ea"/>
+              <a:ea typeface="+mn-ea"/>
+            </a:endParaRPr>
+          </a:p>
+        </p:txBody>
+      </p:sp>
+      <p:pic>
+        <p:nvPicPr>
+          <p:cNvPr id="2" name="Picture 2" descr="Graphical user interface, text, application&#10;&#10;Description automatically generated">
+            <a:extLst>
+              <a:ext uri="{FF2B5EF4-FFF2-40B4-BE49-F238E27FC236}">
+                <a16:creationId xmlns:a16="http://schemas.microsoft.com/office/drawing/2014/main" id="{68E4C506-B74E-CF57-0525-2BE959A781A7}"/>
+              </a:ext>
+            </a:extLst>
+          </p:cNvPr>
+          <p:cNvPicPr>
+            <a:picLocks noChangeAspect="1"/>
+          </p:cNvPicPr>
+          <p:nvPr/>
+        </p:nvPicPr>
+        <p:blipFill>
+          <a:blip r:embed="rId3"/>
+          <a:stretch>
+            <a:fillRect/>
+          </a:stretch>
+        </p:blipFill>
+        <p:spPr>
+          <a:xfrm>
+            <a:off x="1642448" y="3667168"/>
+            <a:ext cx="21689718" cy="5789170"/>
+          </a:xfrm>
+          <a:prstGeom prst="rect">
+            <a:avLst/>
+          </a:prstGeom>
+        </p:spPr>
+      </p:pic>
+    </p:spTree>
+    <p:extLst>
+      <p:ext uri="{BB962C8B-B14F-4D97-AF65-F5344CB8AC3E}">
+        <p14:creationId xmlns:p14="http://schemas.microsoft.com/office/powerpoint/2010/main" val="368310156"/>
+      </p:ext>
+    </p:extLst>
+  </p:cSld>
+  <p:clrMapOvr>
+    <a:masterClrMapping/>
+  </p:clrMapOvr>
+  <p:transition spd="med"/>
+</p:sld>
+</file>
+
+<file path=ppt/slides/slide25.xml><?xml version="1.0" encoding="utf-8"?>
 <p:sld xmlns:a="http://schemas.openxmlformats.org/drawingml/2006/main" xmlns:r="http://schemas.openxmlformats.org/officeDocument/2006/relationships" xmlns:p="http://schemas.openxmlformats.org/presentationml/2006/main" show="0">
   <p:cSld>
     <p:spTree>
@@ -11688,7 +12181,7 @@
           </a:prstGeom>
           <a:extLst>
             <a:ext uri="{C572A759-6A51-4108-AA02-DFA0A04FC94B}">
-              <ma14:wrappingTextBoxFlag xmlns:ma14="http://schemas.microsoft.com/office/mac/drawingml/2011/main" xmlns="" val="1"/>
+              <ma14:wrappingTextBoxFlag xmlns="" xmlns:ma14="http://schemas.microsoft.com/office/mac/drawingml/2011/main" val="1"/>
             </a:ext>
           </a:extLst>
         </p:spPr>
@@ -11697,10 +12190,10 @@
           <a:lstStyle/>
           <a:p>
             <a:fld id="{86CB4B4D-7CA3-9044-876B-883B54F8677D}" type="slidenum">
-              <a:rPr/>
-              <a:t>24</a:t>
+              <a:rPr dirty="0"/>
+              <a:t>25</a:t>
             </a:fld>
-            <a:endParaRPr/>
+            <a:endParaRPr dirty="0"/>
           </a:p>
         </p:txBody>
       </p:sp>
@@ -11771,7 +12264,7 @@
           </a:ln>
           <a:extLst>
             <a:ext uri="{C572A759-6A51-4108-AA02-DFA0A04FC94B}">
-              <ma14:wrappingTextBoxFlag xmlns:ma14="http://schemas.microsoft.com/office/mac/drawingml/2011/main" xmlns="" val="1"/>
+              <ma14:wrappingTextBoxFlag xmlns="" xmlns:ma14="http://schemas.microsoft.com/office/mac/drawingml/2011/main" val="1"/>
             </a:ext>
           </a:extLst>
         </p:spPr>
@@ -11882,7 +12375,7 @@
 </p:sld>
 </file>
 
-<file path=ppt/slides/slide25.xml><?xml version="1.0" encoding="utf-8"?>
+<file path=ppt/slides/slide26.xml><?xml version="1.0" encoding="utf-8"?>
 <p:sld xmlns:a="http://schemas.openxmlformats.org/drawingml/2006/main" xmlns:r="http://schemas.openxmlformats.org/officeDocument/2006/relationships" xmlns:p="http://schemas.openxmlformats.org/presentationml/2006/main">
   <p:cSld>
     <p:spTree>
@@ -12002,7 +12495,7 @@
           </a:prstGeom>
           <a:extLst>
             <a:ext uri="{C572A759-6A51-4108-AA02-DFA0A04FC94B}">
-              <ma14:wrappingTextBoxFlag xmlns:ma14="http://schemas.microsoft.com/office/mac/drawingml/2011/main" xmlns="" val="1"/>
+              <ma14:wrappingTextBoxFlag xmlns="" xmlns:ma14="http://schemas.microsoft.com/office/mac/drawingml/2011/main" val="1"/>
             </a:ext>
           </a:extLst>
         </p:spPr>
@@ -12373,8 +12866,8 @@
         </p:nvSpPr>
         <p:spPr>
           <a:xfrm>
-            <a:off x="993524" y="12267160"/>
-            <a:ext cx="8610397" cy="774701"/>
+            <a:off x="3620350" y="12161180"/>
+            <a:ext cx="7962116" cy="936603"/>
           </a:xfrm>
           <a:prstGeom prst="rect">
             <a:avLst/>
@@ -12384,7 +12877,7 @@
           </a:ln>
           <a:extLst>
             <a:ext uri="{C572A759-6A51-4108-AA02-DFA0A04FC94B}">
-              <ma14:wrappingTextBoxFlag xmlns:ma14="http://schemas.microsoft.com/office/mac/drawingml/2011/main" xmlns="" val="1"/>
+              <ma14:wrappingTextBoxFlag xmlns="" xmlns:ma14="http://schemas.microsoft.com/office/mac/drawingml/2011/main" val="1"/>
             </a:ext>
           </a:extLst>
         </p:spPr>
@@ -12413,20 +12906,10 @@
           </a:lstStyle>
           <a:p>
             <a:r>
-              <a:t>http://www.stsci.edu/jwst/science-planning</a:t>
-            </a:r>
-            <a:endParaRPr sz="1200" b="0">
-              <a:solidFill>
-                <a:schemeClr val="accent5">
-                  <a:hueOff val="-8881752"/>
-                  <a:lumOff val="-12984"/>
-                </a:schemeClr>
-              </a:solidFill>
-              <a:latin typeface="Times"/>
-              <a:ea typeface="Times"/>
-              <a:cs typeface="Times"/>
-              <a:sym typeface="Times"/>
-            </a:endParaRPr>
+              <a:rPr lang="en-US" b="0" dirty="0"/>
+              <a:t>https://www.stsci.edu/jwst/science-planning</a:t>
+            </a:r>
+            <a:endParaRPr lang="en-US" dirty="0"/>
           </a:p>
         </p:txBody>
       </p:sp>
@@ -12603,7 +13086,7 @@
           </a:prstGeom>
           <a:extLst>
             <a:ext uri="{C572A759-6A51-4108-AA02-DFA0A04FC94B}">
-              <ma14:wrappingTextBoxFlag xmlns:ma14="http://schemas.microsoft.com/office/mac/drawingml/2011/main" xmlns="" val="1"/>
+              <ma14:wrappingTextBoxFlag xmlns="" xmlns:ma14="http://schemas.microsoft.com/office/mac/drawingml/2011/main" val="1"/>
             </a:ext>
           </a:extLst>
         </p:spPr>
@@ -12680,7 +13163,15 @@
             </a:r>
             <a:r>
               <a:rPr sz="3200" dirty="0"/>
-              <a:t>For the Cycle 1 GO/AR Call there will be two overall categories of proposals.</a:t>
+              <a:t>For the Cycle </a:t>
+            </a:r>
+            <a:r>
+              <a:rPr lang="en-US" sz="3200" dirty="0"/>
+              <a:t>2</a:t>
+            </a:r>
+            <a:r>
+              <a:rPr sz="3200" dirty="0"/>
+              <a:t> GO/AR Call there will be two overall categories of proposals.</a:t>
             </a:r>
             <a:r>
               <a:rPr lang="en-US" sz="3200" dirty="0"/>
@@ -12947,7 +13438,7 @@
           </a:prstGeom>
           <a:extLst>
             <a:ext uri="{C572A759-6A51-4108-AA02-DFA0A04FC94B}">
-              <ma14:wrappingTextBoxFlag xmlns:ma14="http://schemas.microsoft.com/office/mac/drawingml/2011/main" xmlns="" val="1"/>
+              <ma14:wrappingTextBoxFlag xmlns="" xmlns:ma14="http://schemas.microsoft.com/office/mac/drawingml/2011/main" val="1"/>
             </a:ext>
           </a:extLst>
         </p:spPr>
@@ -13114,7 +13605,7 @@
           </a:ln>
           <a:extLst>
             <a:ext uri="{C572A759-6A51-4108-AA02-DFA0A04FC94B}">
-              <ma14:wrappingTextBoxFlag xmlns:ma14="http://schemas.microsoft.com/office/mac/drawingml/2011/main" xmlns="" val="1"/>
+              <ma14:wrappingTextBoxFlag xmlns="" xmlns:ma14="http://schemas.microsoft.com/office/mac/drawingml/2011/main" val="1"/>
             </a:ext>
           </a:extLst>
         </p:spPr>
@@ -13154,7 +13645,7 @@
         <p:spPr>
           <a:xfrm>
             <a:off x="9848951" y="4786371"/>
-            <a:ext cx="1630254" cy="841256"/>
+            <a:ext cx="1657505" cy="841256"/>
           </a:xfrm>
           <a:prstGeom prst="rect">
             <a:avLst/>
@@ -13164,7 +13655,7 @@
           </a:ln>
           <a:extLst>
             <a:ext uri="{C572A759-6A51-4108-AA02-DFA0A04FC94B}">
-              <ma14:wrappingTextBoxFlag xmlns:ma14="http://schemas.microsoft.com/office/mac/drawingml/2011/main" xmlns="" val="1"/>
+              <ma14:wrappingTextBoxFlag xmlns="" xmlns:ma14="http://schemas.microsoft.com/office/mac/drawingml/2011/main" val="1"/>
             </a:ext>
           </a:extLst>
         </p:spPr>
@@ -13180,9 +13671,8 @@
             </a:r>
             <a:r>
               <a:rPr lang="en-AU" dirty="0"/>
-              <a:t> </a:t>
-            </a:r>
-            <a:endParaRPr dirty="0"/>
+              <a:t>* </a:t>
+            </a:r>
           </a:p>
         </p:txBody>
       </p:sp>
@@ -13205,7 +13695,7 @@
           </a:ln>
           <a:extLst>
             <a:ext uri="{C572A759-6A51-4108-AA02-DFA0A04FC94B}">
-              <ma14:wrappingTextBoxFlag xmlns:ma14="http://schemas.microsoft.com/office/mac/drawingml/2011/main" xmlns="" val="1"/>
+              <ma14:wrappingTextBoxFlag xmlns="" xmlns:ma14="http://schemas.microsoft.com/office/mac/drawingml/2011/main" val="1"/>
             </a:ext>
           </a:extLst>
         </p:spPr>
@@ -13240,7 +13730,7 @@
           </a:ln>
           <a:extLst>
             <a:ext uri="{C572A759-6A51-4108-AA02-DFA0A04FC94B}">
-              <ma14:wrappingTextBoxFlag xmlns:ma14="http://schemas.microsoft.com/office/mac/drawingml/2011/main" xmlns="" val="1"/>
+              <ma14:wrappingTextBoxFlag xmlns="" xmlns:ma14="http://schemas.microsoft.com/office/mac/drawingml/2011/main" val="1"/>
             </a:ext>
           </a:extLst>
         </p:spPr>
@@ -13276,7 +13766,7 @@
           </a:ln>
           <a:extLst>
             <a:ext uri="{C572A759-6A51-4108-AA02-DFA0A04FC94B}">
-              <ma14:wrappingTextBoxFlag xmlns:ma14="http://schemas.microsoft.com/office/mac/drawingml/2011/main" xmlns="" val="1"/>
+              <ma14:wrappingTextBoxFlag xmlns="" xmlns:ma14="http://schemas.microsoft.com/office/mac/drawingml/2011/main" val="1"/>
             </a:ext>
           </a:extLst>
         </p:spPr>
@@ -13311,7 +13801,7 @@
           </a:ln>
           <a:extLst>
             <a:ext uri="{C572A759-6A51-4108-AA02-DFA0A04FC94B}">
-              <ma14:wrappingTextBoxFlag xmlns:ma14="http://schemas.microsoft.com/office/mac/drawingml/2011/main" xmlns="" val="1"/>
+              <ma14:wrappingTextBoxFlag xmlns="" xmlns:ma14="http://schemas.microsoft.com/office/mac/drawingml/2011/main" val="1"/>
             </a:ext>
           </a:extLst>
         </p:spPr>
@@ -13346,7 +13836,7 @@
           </a:ln>
           <a:extLst>
             <a:ext uri="{C572A759-6A51-4108-AA02-DFA0A04FC94B}">
-              <ma14:wrappingTextBoxFlag xmlns:ma14="http://schemas.microsoft.com/office/mac/drawingml/2011/main" xmlns="" val="1"/>
+              <ma14:wrappingTextBoxFlag xmlns="" xmlns:ma14="http://schemas.microsoft.com/office/mac/drawingml/2011/main" val="1"/>
             </a:ext>
           </a:extLst>
         </p:spPr>
@@ -13385,7 +13875,7 @@
           </a:ln>
           <a:extLst>
             <a:ext uri="{C572A759-6A51-4108-AA02-DFA0A04FC94B}">
-              <ma14:wrappingTextBoxFlag xmlns:ma14="http://schemas.microsoft.com/office/mac/drawingml/2011/main" xmlns="" val="1"/>
+              <ma14:wrappingTextBoxFlag xmlns="" xmlns:ma14="http://schemas.microsoft.com/office/mac/drawingml/2011/main" val="1"/>
             </a:ext>
           </a:extLst>
         </p:spPr>
@@ -13424,7 +13914,7 @@
           </a:ln>
           <a:extLst>
             <a:ext uri="{C572A759-6A51-4108-AA02-DFA0A04FC94B}">
-              <ma14:wrappingTextBoxFlag xmlns:ma14="http://schemas.microsoft.com/office/mac/drawingml/2011/main" xmlns="" val="1"/>
+              <ma14:wrappingTextBoxFlag xmlns="" xmlns:ma14="http://schemas.microsoft.com/office/mac/drawingml/2011/main" val="1"/>
             </a:ext>
           </a:extLst>
         </p:spPr>
@@ -13463,7 +13953,7 @@
           </a:ln>
           <a:extLst>
             <a:ext uri="{C572A759-6A51-4108-AA02-DFA0A04FC94B}">
-              <ma14:wrappingTextBoxFlag xmlns:ma14="http://schemas.microsoft.com/office/mac/drawingml/2011/main" xmlns="" val="1"/>
+              <ma14:wrappingTextBoxFlag xmlns="" xmlns:ma14="http://schemas.microsoft.com/office/mac/drawingml/2011/main" val="1"/>
             </a:ext>
           </a:extLst>
         </p:spPr>
@@ -13502,7 +13992,7 @@
           </a:ln>
           <a:extLst>
             <a:ext uri="{C572A759-6A51-4108-AA02-DFA0A04FC94B}">
-              <ma14:wrappingTextBoxFlag xmlns:ma14="http://schemas.microsoft.com/office/mac/drawingml/2011/main" xmlns="" val="1"/>
+              <ma14:wrappingTextBoxFlag xmlns="" xmlns:ma14="http://schemas.microsoft.com/office/mac/drawingml/2011/main" val="1"/>
             </a:ext>
           </a:extLst>
         </p:spPr>
@@ -13546,7 +14036,7 @@
           </a:ln>
           <a:extLst>
             <a:ext uri="{C572A759-6A51-4108-AA02-DFA0A04FC94B}">
-              <ma14:wrappingTextBoxFlag xmlns:ma14="http://schemas.microsoft.com/office/mac/drawingml/2011/main" xmlns="" val="1"/>
+              <ma14:wrappingTextBoxFlag xmlns="" xmlns:ma14="http://schemas.microsoft.com/office/mac/drawingml/2011/main" val="1"/>
             </a:ext>
           </a:extLst>
         </p:spPr>
@@ -13612,7 +14102,7 @@
           </a:prstGeom>
           <a:extLst>
             <a:ext uri="{C572A759-6A51-4108-AA02-DFA0A04FC94B}">
-              <ma14:wrappingTextBoxFlag xmlns:ma14="http://schemas.microsoft.com/office/mac/drawingml/2011/main" xmlns="" val="1"/>
+              <ma14:wrappingTextBoxFlag xmlns="" xmlns:ma14="http://schemas.microsoft.com/office/mac/drawingml/2011/main" val="1"/>
             </a:ext>
           </a:extLst>
         </p:spPr>
@@ -13644,8 +14134,8 @@
           </a:prstGeom>
         </p:spPr>
         <p:txBody>
-          <a:bodyPr>
-            <a:normAutofit fontScale="92500"/>
+          <a:bodyPr lIns="50800" tIns="50800" rIns="50800" bIns="50800" anchor="t">
+            <a:normAutofit/>
           </a:bodyPr>
           <a:lstStyle/>
           <a:p>
@@ -13724,7 +14214,7 @@
             <a:endParaRPr sz="3755" dirty="0"/>
           </a:p>
           <a:p>
-            <a:pPr marL="212370" indent="-212370" defTabSz="196596">
+            <a:pPr marL="212090" indent="-212090" defTabSz="196596">
               <a:lnSpc>
                 <a:spcPts val="6600"/>
               </a:lnSpc>
@@ -13791,7 +14281,7 @@
             </a:r>
           </a:p>
           <a:p>
-            <a:pPr marL="212370" indent="-212370" defTabSz="196596">
+            <a:pPr marL="212090" indent="-212090" defTabSz="196596">
               <a:lnSpc>
                 <a:spcPts val="6600"/>
               </a:lnSpc>
@@ -13813,7 +14303,7 @@
               </a:defRPr>
             </a:pPr>
             <a:r>
-              <a:rPr dirty="0">
+              <a:rPr sz="4050" dirty="0">
                 <a:solidFill>
                   <a:schemeClr val="accent2">
                     <a:lumOff val="10634"/>
@@ -13827,7 +14317,7 @@
               <a:t>Medium Proposals</a:t>
             </a:r>
             <a:r>
-              <a:rPr dirty="0">
+              <a:rPr sz="4050" dirty="0">
                 <a:latin typeface="Avenir Heavy"/>
                 <a:ea typeface="Avenir Heavy"/>
                 <a:cs typeface="Avenir Heavy"/>
@@ -13836,20 +14326,36 @@
               <a:t> </a:t>
             </a:r>
             <a:r>
-              <a:rPr dirty="0"/>
+              <a:rPr sz="4050" dirty="0"/>
               <a:t>(25 to 75 hours) are expected to receive ~</a:t>
             </a:r>
             <a:r>
-              <a:rPr lang="en-AU" dirty="0"/>
+              <a:rPr lang="en-AU" sz="4050" dirty="0"/>
               <a:t>1250</a:t>
             </a:r>
             <a:r>
-              <a:rPr dirty="0"/>
-              <a:t> hours in Cycle 1. These proposals will also be reviewed by topical panels.  They also have a default of 12 months of exclusive access rights.</a:t>
-            </a:r>
-          </a:p>
-          <a:p>
-            <a:pPr marL="212370" indent="-212370" defTabSz="196596">
+              <a:rPr sz="4050" dirty="0"/>
+              <a:t> hours in Cycle </a:t>
+            </a:r>
+            <a:r>
+              <a:rPr lang="en-US" sz="4050" dirty="0"/>
+              <a:t>2</a:t>
+            </a:r>
+            <a:r>
+              <a:rPr sz="4050" dirty="0"/>
+              <a:t>. These proposals will also be reviewed by topical panels.</a:t>
+            </a:r>
+            <a:r>
+              <a:rPr lang="en-US" sz="4050" dirty="0"/>
+              <a:t> </a:t>
+            </a:r>
+            <a:r>
+              <a:rPr sz="4050" dirty="0"/>
+              <a:t> They also have a default of 12 months of exclusive access rights.</a:t>
+            </a:r>
+          </a:p>
+          <a:p>
+            <a:pPr marL="212090" indent="-212090" defTabSz="196596">
               <a:lnSpc>
                 <a:spcPts val="6600"/>
               </a:lnSpc>
@@ -14002,7 +14508,7 @@
           </a:prstGeom>
           <a:extLst>
             <a:ext uri="{C572A759-6A51-4108-AA02-DFA0A04FC94B}">
-              <ma14:wrappingTextBoxFlag xmlns:ma14="http://schemas.microsoft.com/office/mac/drawingml/2011/main" xmlns="" val="1"/>
+              <ma14:wrappingTextBoxFlag xmlns="" xmlns:ma14="http://schemas.microsoft.com/office/mac/drawingml/2011/main" val="1"/>
             </a:ext>
           </a:extLst>
         </p:spPr>
@@ -14038,8 +14544,8 @@
           </a:prstGeom>
         </p:spPr>
         <p:txBody>
-          <a:bodyPr>
-            <a:normAutofit fontScale="85000" lnSpcReduction="10000"/>
+          <a:bodyPr lIns="50800" tIns="50800" rIns="50800" bIns="50800" anchor="t">
+            <a:normAutofit fontScale="92500"/>
           </a:bodyPr>
           <a:lstStyle/>
           <a:p>
@@ -14097,20 +14603,15 @@
               </a:defRPr>
             </a:pPr>
             <a:r>
-              <a:rPr sz="2813" dirty="0">
-                <a:latin typeface="+mn-lt"/>
-                <a:ea typeface="+mn-ea"/>
-                <a:cs typeface="+mn-cs"/>
-                <a:sym typeface="Avenir Book"/>
-              </a:rPr>
-              <a:t> </a:t>
-            </a:r>
-            <a:r>
-              <a:rPr sz="3373" dirty="0"/>
+              <a:rPr lang="en-US" sz="2800" dirty="0"/>
+              <a:t> </a:t>
+            </a:r>
+            <a:r>
+              <a:rPr sz="3350" dirty="0"/>
               <a:t>The </a:t>
             </a:r>
             <a:r>
-              <a:rPr sz="3373" dirty="0">
+              <a:rPr sz="3350" b="1" dirty="0">
                 <a:solidFill>
                   <a:schemeClr val="accent2">
                     <a:lumOff val="10634"/>
@@ -14121,10 +14622,24 @@
                 <a:cs typeface="Avenir Heavy"/>
                 <a:sym typeface="Avenir Heavy"/>
               </a:rPr>
-              <a:t>Joint JWST-</a:t>
-            </a:r>
-            <a:r>
-              <a:rPr lang="en-AU" sz="3373" dirty="0" err="1">
+              <a:t>Joint </a:t>
+            </a:r>
+            <a:r>
+              <a:rPr sz="3350" dirty="0">
+                <a:solidFill>
+                  <a:schemeClr val="accent2">
+                    <a:lumOff val="10634"/>
+                  </a:schemeClr>
+                </a:solidFill>
+                <a:latin typeface="Avenir Heavy"/>
+                <a:ea typeface="Avenir Heavy"/>
+                <a:cs typeface="Avenir Heavy"/>
+                <a:sym typeface="Avenir Heavy"/>
+              </a:rPr>
+              <a:t>JWST-</a:t>
+            </a:r>
+            <a:r>
+              <a:rPr lang="en-AU" sz="3350" dirty="0" err="1">
                 <a:solidFill>
                   <a:schemeClr val="accent2">
                     <a:lumOff val="10634"/>
@@ -14138,7 +14653,7 @@
               <a:t>ALMA,Chandra</a:t>
             </a:r>
             <a:r>
-              <a:rPr lang="en-AU" sz="3373" dirty="0">
+              <a:rPr lang="en-AU" sz="3350" dirty="0">
                 <a:solidFill>
                   <a:schemeClr val="accent2">
                     <a:lumOff val="10634"/>
@@ -14152,7 +14667,7 @@
               <a:t>, HST, NASA-Keck, </a:t>
             </a:r>
             <a:r>
-              <a:rPr lang="en-AU" sz="3373" dirty="0" err="1">
+              <a:rPr lang="en-AU" sz="3350" dirty="0" err="1">
                 <a:solidFill>
                   <a:schemeClr val="accent2">
                     <a:lumOff val="10634"/>
@@ -14166,7 +14681,7 @@
               <a:t>NOIRLab</a:t>
             </a:r>
             <a:r>
-              <a:rPr lang="en-AU" sz="3373" dirty="0">
+              <a:rPr lang="en-AU" sz="3350" dirty="0">
                 <a:solidFill>
                   <a:schemeClr val="accent2">
                     <a:lumOff val="10634"/>
@@ -14180,31 +14695,31 @@
               <a:t>, XMM-Newton</a:t>
             </a:r>
             <a:r>
-              <a:rPr lang="en-AU" sz="3373" dirty="0"/>
+              <a:rPr lang="en-AU" sz="3350" dirty="0"/>
               <a:t> </a:t>
             </a:r>
             <a:r>
-              <a:rPr sz="3373" dirty="0"/>
+              <a:rPr sz="3350" dirty="0"/>
               <a:t>opportunity recognizes the inherent “double jeopardy” in proposing to both reviews to do multi-wavelength work. The JWST TAC review can award </a:t>
             </a:r>
             <a:r>
-              <a:rPr lang="en-AU" sz="3373" dirty="0"/>
+              <a:rPr lang="en-AU" sz="3350" dirty="0"/>
               <a:t>time </a:t>
             </a:r>
             <a:r>
-              <a:rPr sz="3373" dirty="0"/>
+              <a:rPr sz="3350" dirty="0"/>
               <a:t>in which JWST observations comprise the primary science, and an ancillary allocation w</a:t>
             </a:r>
             <a:r>
-              <a:rPr lang="en-AU" sz="3373" dirty="0" err="1"/>
+              <a:rPr lang="en-AU" sz="3350" dirty="0" err="1"/>
               <a:t>hich</a:t>
             </a:r>
             <a:r>
-              <a:rPr lang="en-AU" sz="3373" dirty="0"/>
+              <a:rPr lang="en-AU" sz="3350" dirty="0"/>
               <a:t> </a:t>
             </a:r>
             <a:r>
-              <a:rPr sz="3373" dirty="0"/>
+              <a:rPr sz="3350" dirty="0"/>
               <a:t>complements the JWST proposal. The prime JWST observations can be small, medium, or large in size category.</a:t>
             </a:r>
           </a:p>
@@ -14240,7 +14755,7 @@
             </a:endParaRPr>
           </a:p>
           <a:p>
-            <a:pPr marL="101599" indent="-101599" defTabSz="182880">
+            <a:pPr marL="100965" indent="-100965" defTabSz="182880">
               <a:lnSpc>
                 <a:spcPts val="5600"/>
               </a:lnSpc>
@@ -14321,7 +14836,6 @@
               <a:latin typeface="Times"/>
               <a:ea typeface="Times"/>
               <a:cs typeface="Times"/>
-              <a:sym typeface="Times"/>
             </a:endParaRPr>
           </a:p>
           <a:p>

</xml_diff>